<commit_message>
Fixed issues in release date visualization
</commit_message>
<xml_diff>
--- a/presentation-spotify-hitsongs.pptx
+++ b/presentation-spotify-hitsongs.pptx
@@ -7724,35 +7724,6 @@
       </p:sp>
       <p:pic>
         <p:nvPicPr>
-          <p:cNvPr id="5" name="Content Placeholder 4" descr="Graphical user interface, application&#10;&#10;Description automatically generated">
-            <a:extLst>
-              <a:ext uri="{FF2B5EF4-FFF2-40B4-BE49-F238E27FC236}">
-                <a16:creationId xmlns:a16="http://schemas.microsoft.com/office/drawing/2014/main" id="{9E64DB7B-8A69-6C6F-18B6-458A279A68DE}"/>
-              </a:ext>
-            </a:extLst>
-          </p:cNvPr>
-          <p:cNvPicPr>
-            <a:picLocks noGrp="1" noChangeAspect="1"/>
-          </p:cNvPicPr>
-          <p:nvPr>
-            <p:ph idx="1"/>
-          </p:nvPr>
-        </p:nvPicPr>
-        <p:blipFill>
-          <a:blip r:embed="rId2"/>
-          <a:stretch>
-            <a:fillRect/>
-          </a:stretch>
-        </p:blipFill>
-        <p:spPr>
-          <a:xfrm>
-            <a:off x="747772" y="3615372"/>
-            <a:ext cx="6223232" cy="2489293"/>
-          </a:xfrm>
-        </p:spPr>
-      </p:pic>
-      <p:pic>
-        <p:nvPicPr>
           <p:cNvPr id="7" name="Picture 6" descr="Graphical user interface, chart&#10;&#10;Description automatically generated">
             <a:extLst>
               <a:ext uri="{FF2B5EF4-FFF2-40B4-BE49-F238E27FC236}">
@@ -7766,7 +7737,7 @@
           <p:nvPr/>
         </p:nvPicPr>
         <p:blipFill>
-          <a:blip r:embed="rId3"/>
+          <a:blip r:embed="rId2"/>
           <a:stretch>
             <a:fillRect/>
           </a:stretch>
@@ -7796,7 +7767,7 @@
         <p:spPr>
           <a:xfrm>
             <a:off x="6932588" y="4398354"/>
-            <a:ext cx="4601496" cy="923330"/>
+            <a:ext cx="4601496" cy="1200329"/>
           </a:xfrm>
           <a:prstGeom prst="rect">
             <a:avLst/>
@@ -7822,8 +7793,21 @@
                 <a:latin typeface="Times New Roman" panose="02020603050405020304" pitchFamily="18" charset="0"/>
                 <a:cs typeface="Times New Roman" panose="02020603050405020304" pitchFamily="18" charset="0"/>
               </a:rPr>
-              <a:t> We looked at the release time of songs and found that recent months have seen more successful songs. </a:t>
-            </a:r>
+              <a:t> </a:t>
+            </a:r>
+            <a:r>
+              <a:rPr lang="en-IN" dirty="0">
+                <a:latin typeface="Times New Roman" panose="02020603050405020304" pitchFamily="18" charset="0"/>
+                <a:cs typeface="Times New Roman" panose="02020603050405020304" pitchFamily="18" charset="0"/>
+              </a:rPr>
+              <a:t>We can interpret that songs released around start of the summer months and end of the year are more likely to become 'hit'.</a:t>
+            </a:r>
+            <a:br>
+              <a:rPr lang="en-IN" dirty="0">
+                <a:latin typeface="Times New Roman" panose="02020603050405020304" pitchFamily="18" charset="0"/>
+                <a:cs typeface="Times New Roman" panose="02020603050405020304" pitchFamily="18" charset="0"/>
+              </a:rPr>
+            </a:br>
             <a:endParaRPr lang="en-IN" b="0" i="0" u="none" strike="noStrike" dirty="0">
               <a:solidFill>
                 <a:srgbClr val="000000"/>
@@ -7885,6 +7869,35 @@
           </a:p>
         </p:txBody>
       </p:sp>
+      <p:pic>
+        <p:nvPicPr>
+          <p:cNvPr id="8" name="Content Placeholder 7" descr="Chart, application, scatter chart&#10;&#10;Description automatically generated">
+            <a:extLst>
+              <a:ext uri="{FF2B5EF4-FFF2-40B4-BE49-F238E27FC236}">
+                <a16:creationId xmlns:a16="http://schemas.microsoft.com/office/drawing/2014/main" id="{E92CF5FE-8DD9-2305-8EF4-67A6B85879BD}"/>
+              </a:ext>
+            </a:extLst>
+          </p:cNvPr>
+          <p:cNvPicPr>
+            <a:picLocks noGrp="1" noChangeAspect="1"/>
+          </p:cNvPicPr>
+          <p:nvPr>
+            <p:ph idx="1"/>
+          </p:nvPr>
+        </p:nvPicPr>
+        <p:blipFill>
+          <a:blip r:embed="rId3"/>
+          <a:stretch>
+            <a:fillRect/>
+          </a:stretch>
+        </p:blipFill>
+        <p:spPr>
+          <a:xfrm>
+            <a:off x="717413" y="3672855"/>
+            <a:ext cx="6094388" cy="2437755"/>
+          </a:xfrm>
+        </p:spPr>
+      </p:pic>
     </p:spTree>
     <p:extLst>
       <p:ext uri="{BB962C8B-B14F-4D97-AF65-F5344CB8AC3E}">

</xml_diff>